<commit_message>
Task 2 slides completed and some errors corrected in task 1 slides.
</commit_message>
<xml_diff>
--- a/block1/doc/SlidesB1.pptx
+++ b/block1/doc/SlidesB1.pptx
@@ -5,7 +5,7 @@
     <p:sldMasterId id="2147483648" r:id="rId1"/>
   </p:sldMasterIdLst>
   <p:notesMasterIdLst>
-    <p:notesMasterId r:id="rId10"/>
+    <p:notesMasterId r:id="rId12"/>
   </p:notesMasterIdLst>
   <p:sldIdLst>
     <p:sldId id="256" r:id="rId2"/>
@@ -15,7 +15,9 @@
     <p:sldId id="276" r:id="rId6"/>
     <p:sldId id="277" r:id="rId7"/>
     <p:sldId id="278" r:id="rId8"/>
-    <p:sldId id="261" r:id="rId9"/>
+    <p:sldId id="281" r:id="rId9"/>
+    <p:sldId id="280" r:id="rId10"/>
+    <p:sldId id="261" r:id="rId11"/>
   </p:sldIdLst>
   <p:sldSz cx="9144000" cy="6858000" type="screen4x3"/>
   <p:notesSz cx="6858000" cy="9144000"/>
@@ -215,7 +217,7 @@
           <a:p>
             <a:fld id="{D130885A-CECE-A04B-A1CE-524597C185C6}" type="datetimeFigureOut">
               <a:rPr lang="es-ES" smtClean="0"/>
-              <a:t>14/12/2015</a:t>
+              <a:t>15/12/2015</a:t>
             </a:fld>
             <a:endParaRPr lang="es-ES"/>
           </a:p>
@@ -675,7 +677,7 @@
           <a:p>
             <a:fld id="{216C5678-EE20-4FA5-88E2-6E0BD67A2E26}" type="datetime1">
               <a:rPr lang="en-US" smtClean="0"/>
-              <a:t>12/14/2015</a:t>
+              <a:t>12/15/2015</a:t>
             </a:fld>
             <a:endParaRPr lang="en-US" dirty="0"/>
           </a:p>
@@ -845,7 +847,7 @@
           <a:p>
             <a:fld id="{EA051B39-B140-43FE-96DB-472A2B59CE7C}" type="datetime1">
               <a:rPr lang="en-US" smtClean="0"/>
-              <a:t>12/14/2015</a:t>
+              <a:t>12/15/2015</a:t>
             </a:fld>
             <a:endParaRPr lang="en-US"/>
           </a:p>
@@ -1025,7 +1027,7 @@
           <a:p>
             <a:fld id="{DA600BB2-27C5-458B-ABCE-839C88CF47CE}" type="datetime1">
               <a:rPr lang="en-US" smtClean="0"/>
-              <a:t>12/14/2015</a:t>
+              <a:t>12/15/2015</a:t>
             </a:fld>
             <a:endParaRPr lang="en-US"/>
           </a:p>
@@ -1213,7 +1215,7 @@
           <a:p>
             <a:fld id="{B11D738E-8962-435F-8C43-147B8DD7E819}" type="datetime1">
               <a:rPr lang="en-US" smtClean="0"/>
-              <a:t>12/14/2015</a:t>
+              <a:t>12/15/2015</a:t>
             </a:fld>
             <a:endParaRPr lang="en-US"/>
           </a:p>
@@ -1480,7 +1482,7 @@
           <a:p>
             <a:fld id="{09CAEA93-55E7-4DA9-90C2-089A26EEFEC4}" type="datetime1">
               <a:rPr lang="en-US" smtClean="0"/>
-              <a:t>12/14/2015</a:t>
+              <a:t>12/15/2015</a:t>
             </a:fld>
             <a:endParaRPr lang="en-US"/>
           </a:p>
@@ -1833,7 +1835,7 @@
           <a:p>
             <a:fld id="{E34CF3C7-6809-4F39-BD67-A75817BDDE0A}" type="datetime1">
               <a:rPr lang="en-US" smtClean="0"/>
-              <a:t>12/14/2015</a:t>
+              <a:t>12/15/2015</a:t>
             </a:fld>
             <a:endParaRPr lang="en-US"/>
           </a:p>
@@ -2146,7 +2148,7 @@
           <a:p>
             <a:fld id="{F7EAEB24-CE78-465C-A726-91D0868FA48F}" type="datetime1">
               <a:rPr lang="en-US" smtClean="0"/>
-              <a:t>12/14/2015</a:t>
+              <a:t>12/15/2015</a:t>
             </a:fld>
             <a:endParaRPr lang="en-US"/>
           </a:p>
@@ -2378,7 +2380,7 @@
           <a:p>
             <a:fld id="{40BAADF0-1749-4E8B-9691-B44A5F8C0895}" type="datetime1">
               <a:rPr lang="en-US" smtClean="0"/>
-              <a:t>12/14/2015</a:t>
+              <a:t>12/15/2015</a:t>
             </a:fld>
             <a:endParaRPr lang="en-US"/>
           </a:p>
@@ -2473,7 +2475,7 @@
           <a:p>
             <a:fld id="{A8AF628A-A867-4937-BBE5-207DB6F9C51A}" type="datetime1">
               <a:rPr lang="en-US" smtClean="0"/>
-              <a:t>12/14/2015</a:t>
+              <a:t>12/15/2015</a:t>
             </a:fld>
             <a:endParaRPr lang="en-US"/>
           </a:p>
@@ -2766,7 +2768,7 @@
           <a:p>
             <a:fld id="{118BBB94-68E6-4675-A946-F1C5994EDBD7}" type="datetime1">
               <a:rPr lang="en-US" smtClean="0"/>
-              <a:t>12/14/2015</a:t>
+              <a:t>12/15/2015</a:t>
             </a:fld>
             <a:endParaRPr lang="en-US"/>
           </a:p>
@@ -3040,7 +3042,7 @@
           <a:p>
             <a:fld id="{DC3B8377-21E3-4835-B75D-4E2847E2750F}" type="datetime1">
               <a:rPr lang="en-US" smtClean="0"/>
-              <a:t>12/14/2015</a:t>
+              <a:t>12/15/2015</a:t>
             </a:fld>
             <a:endParaRPr lang="en-US"/>
           </a:p>
@@ -3255,7 +3257,7 @@
           <a:p>
             <a:fld id="{B0C4986D-6BE9-4264-908F-02DB36FD8D6C}" type="datetime1">
               <a:rPr lang="en-US" smtClean="0"/>
-              <a:t>12/14/2015</a:t>
+              <a:t>12/15/2015</a:t>
             </a:fld>
             <a:endParaRPr lang="en-US" dirty="0"/>
           </a:p>
@@ -3803,32 +3805,23 @@
             <a:r>
               <a:rPr lang="en-GB" sz="3800" b="1" dirty="0" smtClean="0">
                 <a:solidFill>
-                  <a:srgbClr val="660066"/>
+                  <a:schemeClr val="accent6">
+                    <a:lumMod val="50000"/>
+                  </a:schemeClr>
                 </a:solidFill>
               </a:rPr>
-              <a:t>M4 </a:t>
-            </a:r>
-            <a:r>
-              <a:rPr lang="en-GB" sz="3800" b="1" dirty="0" smtClean="0">
-                <a:solidFill>
-                  <a:srgbClr val="660066"/>
-                </a:solidFill>
-              </a:rPr>
-              <a:t>- </a:t>
+              <a:t>M4 - </a:t>
             </a:r>
             <a:r>
               <a:rPr lang="en-GB" sz="3800" b="1" dirty="0">
                 <a:solidFill>
-                  <a:srgbClr val="660066"/>
+                  <a:schemeClr val="accent6">
+                    <a:lumMod val="50000"/>
+                  </a:schemeClr>
                 </a:solidFill>
               </a:rPr>
               <a:t>Video Analysis</a:t>
             </a:r>
-            <a:endParaRPr lang="en-GB" sz="3800" b="1" dirty="0">
-              <a:solidFill>
-                <a:srgbClr val="660066"/>
-              </a:solidFill>
-            </a:endParaRPr>
           </a:p>
         </p:txBody>
       </p:sp>
@@ -3904,23 +3897,8 @@
                 </a:solidFill>
                 <a:latin typeface="+mn-lt"/>
               </a:rPr>
-              <a:t>Pau </a:t>
-            </a:r>
-            <a:r>
-              <a:rPr lang="ca-ES" dirty="0" smtClean="0">
-                <a:solidFill>
-                  <a:schemeClr val="tx1"/>
-                </a:solidFill>
-                <a:latin typeface="+mn-lt"/>
-              </a:rPr>
-              <a:t>Riba</a:t>
-            </a:r>
-            <a:endParaRPr lang="ca-ES" dirty="0" smtClean="0">
-              <a:solidFill>
-                <a:schemeClr val="tx1"/>
-              </a:solidFill>
-              <a:latin typeface="+mn-lt"/>
-            </a:endParaRPr>
+              <a:t>Pau Riba</a:t>
+            </a:r>
           </a:p>
         </p:txBody>
       </p:sp>
@@ -4015,15 +3993,7 @@
                   <a:srgbClr val="660066"/>
                 </a:solidFill>
               </a:rPr>
-              <a:t>Block </a:t>
-            </a:r>
-            <a:r>
-              <a:rPr lang="en-US" sz="2200" b="1" dirty="0" smtClean="0">
-                <a:solidFill>
-                  <a:srgbClr val="660066"/>
-                </a:solidFill>
-              </a:rPr>
-              <a:t>1</a:t>
+              <a:t>Block 1</a:t>
             </a:r>
             <a:r>
               <a:rPr lang="en-US" sz="2200" dirty="0">
@@ -4033,11 +4003,6 @@
               </a:rPr>
               <a:t>. Assessment of Foreground Extraction and Optical Flow</a:t>
             </a:r>
-            <a:endParaRPr lang="en-US" sz="2200" dirty="0">
-              <a:solidFill>
-                <a:srgbClr val="660066"/>
-              </a:solidFill>
-            </a:endParaRPr>
           </a:p>
           <a:p>
             <a:pPr algn="l"/>
@@ -4053,6 +4018,80 @@
     <p:extLst>
       <p:ext uri="{BB962C8B-B14F-4D97-AF65-F5344CB8AC3E}">
         <p14:creationId xmlns:p14="http://schemas.microsoft.com/office/powerpoint/2010/main" val="591726926"/>
+      </p:ext>
+    </p:extLst>
+  </p:cSld>
+  <p:clrMapOvr>
+    <a:masterClrMapping/>
+  </p:clrMapOvr>
+  <p:timing>
+    <p:tnLst>
+      <p:par>
+        <p:cTn id="1" dur="indefinite" restart="never" nodeType="tmRoot"/>
+      </p:par>
+    </p:tnLst>
+  </p:timing>
+</p:sld>
+</file>
+
+<file path=ppt/slides/slide10.xml><?xml version="1.0" encoding="utf-8"?>
+<p:sld xmlns:a="http://schemas.openxmlformats.org/drawingml/2006/main" xmlns:r="http://schemas.openxmlformats.org/officeDocument/2006/relationships" xmlns:p="http://schemas.openxmlformats.org/presentationml/2006/main">
+  <p:cSld>
+    <p:spTree>
+      <p:nvGrpSpPr>
+        <p:cNvPr id="1" name=""/>
+        <p:cNvGrpSpPr/>
+        <p:nvPr/>
+      </p:nvGrpSpPr>
+      <p:grpSpPr>
+        <a:xfrm>
+          <a:off x="0" y="0"/>
+          <a:ext cx="0" cy="0"/>
+          <a:chOff x="0" y="0"/>
+          <a:chExt cx="0" cy="0"/>
+        </a:xfrm>
+      </p:grpSpPr>
+      <p:pic>
+        <p:nvPicPr>
+          <p:cNvPr id="4" name="Imagen 3" descr="Captura de pantalla 2015-10-17 a las 22.59.28.png"/>
+          <p:cNvPicPr>
+            <a:picLocks noChangeAspect="1"/>
+          </p:cNvPicPr>
+          <p:nvPr/>
+        </p:nvPicPr>
+        <p:blipFill>
+          <a:blip r:embed="rId2">
+            <a:alphaModFix amt="80000"/>
+            <a:extLst>
+              <a:ext uri="{28A0092B-C50C-407E-A947-70E740481C1C}">
+                <a14:useLocalDpi xmlns:a14="http://schemas.microsoft.com/office/drawing/2010/main" val="0"/>
+              </a:ext>
+            </a:extLst>
+          </a:blip>
+          <a:stretch>
+            <a:fillRect/>
+          </a:stretch>
+        </p:blipFill>
+        <p:spPr>
+          <a:xfrm>
+            <a:off x="0" y="-11442"/>
+            <a:ext cx="9144000" cy="2513880"/>
+          </a:xfrm>
+          <a:prstGeom prst="rect">
+            <a:avLst/>
+          </a:prstGeom>
+          <a:ln>
+            <a:noFill/>
+          </a:ln>
+          <a:effectLst>
+            <a:softEdge rad="112500"/>
+          </a:effectLst>
+        </p:spPr>
+      </p:pic>
+    </p:spTree>
+    <p:extLst>
+      <p:ext uri="{BB962C8B-B14F-4D97-AF65-F5344CB8AC3E}">
+        <p14:creationId xmlns:p14="http://schemas.microsoft.com/office/powerpoint/2010/main" val="14960951"/>
       </p:ext>
     </p:extLst>
   </p:cSld>
@@ -4099,7 +4138,7 @@
         <p:spPr>
           <a:xfrm>
             <a:off x="469065" y="377580"/>
-            <a:ext cx="4740119" cy="686515"/>
+            <a:ext cx="7053399" cy="686515"/>
           </a:xfrm>
         </p:spPr>
         <p:txBody>
@@ -4110,12 +4149,32 @@
             <a:r>
               <a:rPr lang="en-GB" sz="4000" b="1" dirty="0" smtClean="0">
                 <a:solidFill>
-                  <a:srgbClr val="660066"/>
+                  <a:srgbClr val="375350"/>
                 </a:solidFill>
               </a:rPr>
-              <a:t>Task 1</a:t>
-            </a:r>
-            <a:endParaRPr lang="es-ES" sz="4000" dirty="0"/>
+              <a:t>Task </a:t>
+            </a:r>
+            <a:r>
+              <a:rPr lang="en-GB" sz="4000" b="1" dirty="0" smtClean="0">
+                <a:solidFill>
+                  <a:srgbClr val="375350"/>
+                </a:solidFill>
+              </a:rPr>
+              <a:t>1: </a:t>
+            </a:r>
+            <a:r>
+              <a:rPr lang="en-GB" sz="2800" b="1" dirty="0" smtClean="0">
+                <a:solidFill>
+                  <a:srgbClr val="375350"/>
+                </a:solidFill>
+              </a:rPr>
+              <a:t>calculate global metrics </a:t>
+            </a:r>
+            <a:endParaRPr lang="es-ES" sz="2800" dirty="0">
+              <a:solidFill>
+                <a:srgbClr val="375350"/>
+              </a:solidFill>
+            </a:endParaRPr>
           </a:p>
         </p:txBody>
       </p:sp>
@@ -4152,7 +4211,7 @@
       </p:pic>
       <p:pic>
         <p:nvPicPr>
-          <p:cNvPr id="7" name="Imagen 6"/>
+          <p:cNvPr id="8" name="Imagen 7"/>
           <p:cNvPicPr>
             <a:picLocks noChangeAspect="1"/>
           </p:cNvPicPr>
@@ -4172,17 +4231,232 @@
         </p:blipFill>
         <p:spPr>
           <a:xfrm>
-            <a:off x="5723646" y="1503746"/>
-            <a:ext cx="2370315" cy="1788778"/>
+            <a:off x="732787" y="1918516"/>
+            <a:ext cx="2374561" cy="1780921"/>
           </a:xfrm>
           <a:prstGeom prst="rect">
             <a:avLst/>
           </a:prstGeom>
         </p:spPr>
       </p:pic>
+      <p:sp>
+        <p:nvSpPr>
+          <p:cNvPr id="9" name="CuadroTexto 8"/>
+          <p:cNvSpPr txBox="1"/>
+          <p:nvPr/>
+        </p:nvSpPr>
+        <p:spPr>
+          <a:xfrm>
+            <a:off x="636513" y="3769409"/>
+            <a:ext cx="2374561" cy="381899"/>
+          </a:xfrm>
+          <a:prstGeom prst="rect">
+            <a:avLst/>
+          </a:prstGeom>
+          <a:noFill/>
+        </p:spPr>
+        <p:txBody>
+          <a:bodyPr wrap="square" rtlCol="0">
+            <a:spAutoFit/>
+          </a:bodyPr>
+          <a:lstStyle/>
+          <a:p>
+            <a:pPr algn="ctr"/>
+            <a:r>
+              <a:rPr lang="en-US" dirty="0" smtClean="0"/>
+              <a:t>Original image</a:t>
+            </a:r>
+            <a:endParaRPr lang="en-US" dirty="0"/>
+          </a:p>
+        </p:txBody>
+      </p:sp>
+      <p:sp>
+        <p:nvSpPr>
+          <p:cNvPr id="11" name="CuadroTexto 10"/>
+          <p:cNvSpPr txBox="1"/>
+          <p:nvPr/>
+        </p:nvSpPr>
+        <p:spPr>
+          <a:xfrm>
+            <a:off x="5991870" y="3787604"/>
+            <a:ext cx="2370315" cy="369332"/>
+          </a:xfrm>
+          <a:prstGeom prst="rect">
+            <a:avLst/>
+          </a:prstGeom>
+          <a:noFill/>
+        </p:spPr>
+        <p:txBody>
+          <a:bodyPr wrap="square" rtlCol="0">
+            <a:spAutoFit/>
+          </a:bodyPr>
+          <a:lstStyle/>
+          <a:p>
+            <a:pPr algn="ctr"/>
+            <a:r>
+              <a:rPr lang="en-US" dirty="0" smtClean="0"/>
+              <a:t>Segmentation</a:t>
+            </a:r>
+            <a:endParaRPr lang="en-US" dirty="0"/>
+          </a:p>
+        </p:txBody>
+      </p:sp>
+      <p:sp>
+        <p:nvSpPr>
+          <p:cNvPr id="13" name="CuadroTexto 12"/>
+          <p:cNvSpPr txBox="1"/>
+          <p:nvPr/>
+        </p:nvSpPr>
+        <p:spPr>
+          <a:xfrm>
+            <a:off x="3361255" y="3770539"/>
+            <a:ext cx="2376709" cy="381899"/>
+          </a:xfrm>
+          <a:prstGeom prst="rect">
+            <a:avLst/>
+          </a:prstGeom>
+          <a:noFill/>
+        </p:spPr>
+        <p:txBody>
+          <a:bodyPr wrap="square" rtlCol="0">
+            <a:spAutoFit/>
+          </a:bodyPr>
+          <a:lstStyle/>
+          <a:p>
+            <a:pPr algn="ctr"/>
+            <a:r>
+              <a:rPr lang="en-US" dirty="0" smtClean="0"/>
+              <a:t>Ground truth</a:t>
+            </a:r>
+            <a:endParaRPr lang="en-US" dirty="0"/>
+          </a:p>
+        </p:txBody>
+      </p:sp>
+      <p:sp>
+        <p:nvSpPr>
+          <p:cNvPr id="17" name="CuadroTexto 16"/>
+          <p:cNvSpPr txBox="1"/>
+          <p:nvPr/>
+        </p:nvSpPr>
+        <p:spPr>
+          <a:xfrm>
+            <a:off x="1865376" y="4497585"/>
+            <a:ext cx="5107106" cy="1200329"/>
+          </a:xfrm>
+          <a:prstGeom prst="rect">
+            <a:avLst/>
+          </a:prstGeom>
+          <a:noFill/>
+        </p:spPr>
+        <p:txBody>
+          <a:bodyPr wrap="square" rtlCol="0">
+            <a:spAutoFit/>
+          </a:bodyPr>
+          <a:lstStyle/>
+          <a:p>
+            <a:r>
+              <a:rPr lang="en-US" dirty="0" smtClean="0"/>
+              <a:t>Ground-truth AND Segmentation      = </a:t>
+            </a:r>
+            <a:r>
+              <a:rPr lang="en-US" dirty="0" err="1" smtClean="0"/>
+              <a:t>TP</a:t>
+            </a:r>
+            <a:endParaRPr lang="en-US" dirty="0" smtClean="0"/>
+          </a:p>
+          <a:p>
+            <a:r>
+              <a:rPr lang="en-US" dirty="0" smtClean="0"/>
+              <a:t>Ground-truth AND ¬Segmentation    = FP</a:t>
+            </a:r>
+          </a:p>
+          <a:p>
+            <a:r>
+              <a:rPr lang="en-US" dirty="0" smtClean="0"/>
+              <a:t>¬Ground-truth </a:t>
+            </a:r>
+            <a:r>
+              <a:rPr lang="en-US" dirty="0"/>
+              <a:t>AND </a:t>
+            </a:r>
+            <a:r>
+              <a:rPr lang="en-US" dirty="0" smtClean="0"/>
+              <a:t>¬Segmentation  = TN</a:t>
+            </a:r>
+          </a:p>
+          <a:p>
+            <a:r>
+              <a:rPr lang="en-US" dirty="0" smtClean="0"/>
+              <a:t>¬Ground-truth AND Segmentation    = FN</a:t>
+            </a:r>
+            <a:endParaRPr lang="en-US" dirty="0"/>
+          </a:p>
+        </p:txBody>
+      </p:sp>
+      <p:sp>
+        <p:nvSpPr>
+          <p:cNvPr id="19" name="CuadroTexto 18"/>
+          <p:cNvSpPr txBox="1"/>
+          <p:nvPr/>
+        </p:nvSpPr>
+        <p:spPr>
+          <a:xfrm>
+            <a:off x="1985684" y="5810839"/>
+            <a:ext cx="1440268" cy="338554"/>
+          </a:xfrm>
+          <a:prstGeom prst="rect">
+            <a:avLst/>
+          </a:prstGeom>
+          <a:noFill/>
+        </p:spPr>
+        <p:txBody>
+          <a:bodyPr wrap="square" rtlCol="0">
+            <a:spAutoFit/>
+          </a:bodyPr>
+          <a:lstStyle/>
+          <a:p>
+            <a:r>
+              <a:rPr lang="en-US" sz="1600" i="1" dirty="0" smtClean="0"/>
+              <a:t>(¬ = negation)</a:t>
+            </a:r>
+            <a:endParaRPr lang="en-US" sz="1600" i="1" dirty="0"/>
+          </a:p>
+        </p:txBody>
+      </p:sp>
+      <p:sp>
+        <p:nvSpPr>
+          <p:cNvPr id="12" name="CuadroTexto 11"/>
+          <p:cNvSpPr txBox="1"/>
+          <p:nvPr/>
+        </p:nvSpPr>
+        <p:spPr>
+          <a:xfrm>
+            <a:off x="731714" y="1536618"/>
+            <a:ext cx="2374561" cy="381899"/>
+          </a:xfrm>
+          <a:prstGeom prst="rect">
+            <a:avLst/>
+          </a:prstGeom>
+          <a:noFill/>
+        </p:spPr>
+        <p:txBody>
+          <a:bodyPr wrap="square" rtlCol="0">
+            <a:spAutoFit/>
+          </a:bodyPr>
+          <a:lstStyle/>
+          <a:p>
+            <a:pPr algn="ctr"/>
+            <a:r>
+              <a:rPr lang="en-US" dirty="0" smtClean="0"/>
+              <a:t>RGB image</a:t>
+            </a:r>
+            <a:endParaRPr lang="en-US" dirty="0"/>
+          </a:p>
+        </p:txBody>
+      </p:sp>
       <p:pic>
         <p:nvPicPr>
-          <p:cNvPr id="8" name="Imagen 7"/>
+          <p:cNvPr id="3" name="Imagen 2"/>
           <p:cNvPicPr>
             <a:picLocks noChangeAspect="1"/>
           </p:cNvPicPr>
@@ -4202,8 +4476,8 @@
         </p:blipFill>
         <p:spPr>
           <a:xfrm>
-            <a:off x="464563" y="1503745"/>
-            <a:ext cx="2374561" cy="1780921"/>
+            <a:off x="3359911" y="1916499"/>
+            <a:ext cx="2377250" cy="1782937"/>
           </a:xfrm>
           <a:prstGeom prst="rect">
             <a:avLst/>
@@ -4212,13 +4486,13 @@
       </p:pic>
       <p:sp>
         <p:nvSpPr>
-          <p:cNvPr id="9" name="CuadroTexto 8"/>
+          <p:cNvPr id="14" name="CuadroTexto 13"/>
           <p:cNvSpPr txBox="1"/>
           <p:nvPr/>
         </p:nvSpPr>
         <p:spPr>
           <a:xfrm>
-            <a:off x="368289" y="3354638"/>
+            <a:off x="3363403" y="1534600"/>
             <a:ext cx="2374561" cy="381899"/>
           </a:xfrm>
           <a:prstGeom prst="rect">
@@ -4235,7 +4509,7 @@
             <a:pPr algn="ctr"/>
             <a:r>
               <a:rPr lang="en-US" dirty="0" smtClean="0"/>
-              <a:t>Original image</a:t>
+              <a:t>Greyscale image</a:t>
             </a:r>
             <a:endParaRPr lang="en-US" dirty="0"/>
           </a:p>
@@ -4243,14 +4517,14 @@
       </p:sp>
       <p:sp>
         <p:nvSpPr>
-          <p:cNvPr id="11" name="CuadroTexto 10"/>
+          <p:cNvPr id="15" name="CuadroTexto 14"/>
           <p:cNvSpPr txBox="1"/>
           <p:nvPr/>
         </p:nvSpPr>
         <p:spPr>
           <a:xfrm>
-            <a:off x="6092171" y="3372833"/>
-            <a:ext cx="1633264" cy="369332"/>
+            <a:off x="5987624" y="1536618"/>
+            <a:ext cx="2374561" cy="381899"/>
           </a:xfrm>
           <a:prstGeom prst="rect">
             <a:avLst/>
@@ -4266,7 +4540,7 @@
             <a:pPr algn="ctr"/>
             <a:r>
               <a:rPr lang="en-US" dirty="0" smtClean="0"/>
-              <a:t>Segmentation</a:t>
+              <a:t>Binary image</a:t>
             </a:r>
             <a:endParaRPr lang="en-US" dirty="0"/>
           </a:p>
@@ -4274,156 +4548,28 @@
       </p:sp>
       <p:pic>
         <p:nvPicPr>
-          <p:cNvPr id="10" name="Imagen 9"/>
+          <p:cNvPr id="5" name="Imagen 4"/>
           <p:cNvPicPr>
             <a:picLocks noChangeAspect="1"/>
           </p:cNvPicPr>
           <p:nvPr/>
         </p:nvPicPr>
         <p:blipFill>
-          <a:blip r:embed="rId5" cstate="email">
-            <a:extLst>
-              <a:ext uri="{28A0092B-C50C-407E-A947-70E740481C1C}">
-                <a14:useLocalDpi xmlns:a14="http://schemas.microsoft.com/office/drawing/2010/main" val="0"/>
-              </a:ext>
-            </a:extLst>
-          </a:blip>
+          <a:blip r:embed="rId5"/>
           <a:stretch>
             <a:fillRect/>
           </a:stretch>
         </p:blipFill>
         <p:spPr>
           <a:xfrm>
-            <a:off x="3093031" y="1502134"/>
-            <a:ext cx="2376709" cy="1782532"/>
+            <a:off x="5993216" y="1906358"/>
+            <a:ext cx="2382029" cy="1803218"/>
           </a:xfrm>
           <a:prstGeom prst="rect">
             <a:avLst/>
           </a:prstGeom>
         </p:spPr>
       </p:pic>
-      <p:sp>
-        <p:nvSpPr>
-          <p:cNvPr id="13" name="CuadroTexto 12"/>
-          <p:cNvSpPr txBox="1"/>
-          <p:nvPr/>
-        </p:nvSpPr>
-        <p:spPr>
-          <a:xfrm>
-            <a:off x="3425952" y="3355768"/>
-            <a:ext cx="1924000" cy="381899"/>
-          </a:xfrm>
-          <a:prstGeom prst="rect">
-            <a:avLst/>
-          </a:prstGeom>
-          <a:noFill/>
-        </p:spPr>
-        <p:txBody>
-          <a:bodyPr wrap="square" rtlCol="0">
-            <a:spAutoFit/>
-          </a:bodyPr>
-          <a:lstStyle/>
-          <a:p>
-            <a:pPr algn="ctr"/>
-            <a:r>
-              <a:rPr lang="en-US" dirty="0" smtClean="0"/>
-              <a:t>Ground truth</a:t>
-            </a:r>
-            <a:endParaRPr lang="en-US" dirty="0"/>
-          </a:p>
-        </p:txBody>
-      </p:sp>
-      <p:sp>
-        <p:nvSpPr>
-          <p:cNvPr id="17" name="CuadroTexto 16"/>
-          <p:cNvSpPr txBox="1"/>
-          <p:nvPr/>
-        </p:nvSpPr>
-        <p:spPr>
-          <a:xfrm>
-            <a:off x="1865376" y="4185965"/>
-            <a:ext cx="5107106" cy="1200329"/>
-          </a:xfrm>
-          <a:prstGeom prst="rect">
-            <a:avLst/>
-          </a:prstGeom>
-          <a:noFill/>
-        </p:spPr>
-        <p:txBody>
-          <a:bodyPr wrap="square" rtlCol="0">
-            <a:spAutoFit/>
-          </a:bodyPr>
-          <a:lstStyle/>
-          <a:p>
-            <a:r>
-              <a:rPr lang="en-US" dirty="0" smtClean="0"/>
-              <a:t>Ground-truth AND Segmentation      = </a:t>
-            </a:r>
-            <a:r>
-              <a:rPr lang="en-US" dirty="0" err="1" smtClean="0"/>
-              <a:t>TP</a:t>
-            </a:r>
-            <a:endParaRPr lang="en-US" dirty="0" smtClean="0"/>
-          </a:p>
-          <a:p>
-            <a:r>
-              <a:rPr lang="en-US" dirty="0" smtClean="0"/>
-              <a:t>Ground-truth AND ¬Segmentation    = FP</a:t>
-            </a:r>
-          </a:p>
-          <a:p>
-            <a:r>
-              <a:rPr lang="en-US" dirty="0" smtClean="0"/>
-              <a:t>¬Ground-truth </a:t>
-            </a:r>
-            <a:r>
-              <a:rPr lang="en-US" dirty="0"/>
-              <a:t>AND </a:t>
-            </a:r>
-            <a:r>
-              <a:rPr lang="en-US" dirty="0" smtClean="0"/>
-              <a:t>¬Segmentation  = TN</a:t>
-            </a:r>
-          </a:p>
-          <a:p>
-            <a:r>
-              <a:rPr lang="en-US" dirty="0" smtClean="0"/>
-              <a:t>¬Ground-truth AND Segmentation    = FN</a:t>
-            </a:r>
-            <a:endParaRPr lang="en-US" dirty="0"/>
-          </a:p>
-        </p:txBody>
-      </p:sp>
-      <p:sp>
-        <p:nvSpPr>
-          <p:cNvPr id="19" name="CuadroTexto 18"/>
-          <p:cNvSpPr txBox="1"/>
-          <p:nvPr/>
-        </p:nvSpPr>
-        <p:spPr>
-          <a:xfrm>
-            <a:off x="1985684" y="5499219"/>
-            <a:ext cx="1440268" cy="338554"/>
-          </a:xfrm>
-          <a:prstGeom prst="rect">
-            <a:avLst/>
-          </a:prstGeom>
-          <a:noFill/>
-        </p:spPr>
-        <p:txBody>
-          <a:bodyPr wrap="square" rtlCol="0">
-            <a:spAutoFit/>
-          </a:bodyPr>
-          <a:lstStyle/>
-          <a:p>
-            <a:r>
-              <a:rPr lang="en-US" sz="1600" i="1" dirty="0" smtClean="0"/>
-              <a:t>(¬ = negation)</a:t>
-            </a:r>
-            <a:endParaRPr lang="en-US" sz="1600" i="1" dirty="0"/>
-          </a:p>
-        </p:txBody>
-      </p:sp>
     </p:spTree>
     <p:extLst>
       <p:ext uri="{BB962C8B-B14F-4D97-AF65-F5344CB8AC3E}">
@@ -4461,39 +4607,6 @@
           <a:chExt cx="0" cy="0"/>
         </a:xfrm>
       </p:grpSpPr>
-      <p:sp>
-        <p:nvSpPr>
-          <p:cNvPr id="2" name="Título 1"/>
-          <p:cNvSpPr>
-            <a:spLocks noGrp="1"/>
-          </p:cNvSpPr>
-          <p:nvPr>
-            <p:ph type="title"/>
-          </p:nvPr>
-        </p:nvSpPr>
-        <p:spPr>
-          <a:xfrm>
-            <a:off x="469065" y="377580"/>
-            <a:ext cx="4740119" cy="686515"/>
-          </a:xfrm>
-        </p:spPr>
-        <p:txBody>
-          <a:bodyPr/>
-          <a:lstStyle/>
-          <a:p>
-            <a:pPr algn="l"/>
-            <a:r>
-              <a:rPr lang="en-GB" sz="4000" b="1" dirty="0" smtClean="0">
-                <a:solidFill>
-                  <a:srgbClr val="660066"/>
-                </a:solidFill>
-              </a:rPr>
-              <a:t>Task 1</a:t>
-            </a:r>
-            <a:endParaRPr lang="es-ES" sz="4000" dirty="0"/>
-          </a:p>
-        </p:txBody>
-      </p:sp>
       <p:pic>
         <p:nvPicPr>
           <p:cNvPr id="4" name="Imagen 3" descr="Captura de pantalla 2015-10-17 a las 23.22.37.png"/>
@@ -4906,6 +5019,85 @@
           </a:graphicData>
         </a:graphic>
       </p:graphicFrame>
+      <p:sp>
+        <p:nvSpPr>
+          <p:cNvPr id="6" name="Título 1"/>
+          <p:cNvSpPr txBox="1">
+            <a:spLocks/>
+          </p:cNvSpPr>
+          <p:nvPr/>
+        </p:nvSpPr>
+        <p:spPr>
+          <a:xfrm>
+            <a:off x="469065" y="377580"/>
+            <a:ext cx="7053399" cy="686515"/>
+          </a:xfrm>
+          <a:prstGeom prst="rect">
+            <a:avLst/>
+          </a:prstGeom>
+        </p:spPr>
+        <p:txBody>
+          <a:bodyPr vert="horz" lIns="91440" tIns="45720" rIns="91440" bIns="45720" rtlCol="0" anchor="b">
+            <a:noAutofit/>
+          </a:bodyPr>
+          <a:lstStyle>
+            <a:lvl1pPr algn="ctr" defTabSz="914400" rtl="0" eaLnBrk="1" latinLnBrk="0" hangingPunct="1">
+              <a:lnSpc>
+                <a:spcPts val="5800"/>
+              </a:lnSpc>
+              <a:spcBef>
+                <a:spcPct val="0"/>
+              </a:spcBef>
+              <a:buNone/>
+              <a:defRPr sz="5400" kern="1200">
+                <a:solidFill>
+                  <a:schemeClr val="tx2"/>
+                </a:solidFill>
+                <a:effectLst>
+                  <a:outerShdw blurRad="63500" dist="38100" dir="5400000" algn="t" rotWithShape="0">
+                    <a:prstClr val="black">
+                      <a:alpha val="25000"/>
+                    </a:prstClr>
+                  </a:outerShdw>
+                </a:effectLst>
+                <a:latin typeface="+mn-lt"/>
+                <a:ea typeface="+mj-ea"/>
+                <a:cs typeface="+mj-cs"/>
+              </a:defRPr>
+            </a:lvl1pPr>
+          </a:lstStyle>
+          <a:p>
+            <a:pPr algn="l"/>
+            <a:r>
+              <a:rPr lang="en-GB" sz="4000" b="1" dirty="0" smtClean="0">
+                <a:solidFill>
+                  <a:schemeClr val="accent6">
+                    <a:lumMod val="50000"/>
+                  </a:schemeClr>
+                </a:solidFill>
+              </a:rPr>
+              <a:t>Task 1: </a:t>
+            </a:r>
+            <a:r>
+              <a:rPr lang="en-GB" sz="2800" b="1" dirty="0" smtClean="0">
+                <a:solidFill>
+                  <a:schemeClr val="accent6">
+                    <a:lumMod val="50000"/>
+                  </a:schemeClr>
+                </a:solidFill>
+              </a:rPr>
+              <a:t>calculate global metrics </a:t>
+            </a:r>
+            <a:endParaRPr lang="es-ES" sz="2800" dirty="0">
+              <a:solidFill>
+                <a:schemeClr val="accent6">
+                  <a:lumMod val="50000"/>
+                </a:schemeClr>
+              </a:solidFill>
+            </a:endParaRPr>
+          </a:p>
+        </p:txBody>
+      </p:sp>
     </p:spTree>
     <p:extLst>
       <p:ext uri="{BB962C8B-B14F-4D97-AF65-F5344CB8AC3E}">
@@ -4943,39 +5135,6 @@
           <a:chExt cx="0" cy="0"/>
         </a:xfrm>
       </p:grpSpPr>
-      <p:sp>
-        <p:nvSpPr>
-          <p:cNvPr id="2" name="Título 1"/>
-          <p:cNvSpPr>
-            <a:spLocks noGrp="1"/>
-          </p:cNvSpPr>
-          <p:nvPr>
-            <p:ph type="title"/>
-          </p:nvPr>
-        </p:nvSpPr>
-        <p:spPr>
-          <a:xfrm>
-            <a:off x="469065" y="377580"/>
-            <a:ext cx="4740119" cy="686515"/>
-          </a:xfrm>
-        </p:spPr>
-        <p:txBody>
-          <a:bodyPr/>
-          <a:lstStyle/>
-          <a:p>
-            <a:pPr algn="l"/>
-            <a:r>
-              <a:rPr lang="en-GB" sz="4000" b="1" dirty="0" smtClean="0">
-                <a:solidFill>
-                  <a:srgbClr val="660066"/>
-                </a:solidFill>
-              </a:rPr>
-              <a:t>Task 2</a:t>
-            </a:r>
-            <a:endParaRPr lang="es-ES" sz="4000" dirty="0"/>
-          </a:p>
-        </p:txBody>
-      </p:sp>
       <p:pic>
         <p:nvPicPr>
           <p:cNvPr id="4" name="Imagen 3" descr="Captura de pantalla 2015-10-17 a las 23.22.37.png"/>
@@ -5009,60 +5168,383 @@
       </p:pic>
       <p:sp>
         <p:nvSpPr>
-          <p:cNvPr id="18" name="Marcador de contenido 2"/>
-          <p:cNvSpPr>
-            <a:spLocks noGrp="1"/>
-          </p:cNvSpPr>
-          <p:nvPr>
-            <p:ph idx="1"/>
-          </p:nvPr>
-        </p:nvSpPr>
-        <p:spPr>
-          <a:xfrm>
-            <a:off x="621790" y="1434071"/>
-            <a:ext cx="7569769" cy="774220"/>
-          </a:xfrm>
-        </p:spPr>
-        <p:txBody>
-          <a:bodyPr>
+          <p:cNvPr id="7" name="Título 1"/>
+          <p:cNvSpPr txBox="1">
+            <a:spLocks/>
+          </p:cNvSpPr>
+          <p:nvPr/>
+        </p:nvSpPr>
+        <p:spPr>
+          <a:xfrm>
+            <a:off x="469065" y="377580"/>
+            <a:ext cx="7053399" cy="686515"/>
+          </a:xfrm>
+          <a:prstGeom prst="rect">
+            <a:avLst/>
+          </a:prstGeom>
+        </p:spPr>
+        <p:txBody>
+          <a:bodyPr vert="horz" lIns="91440" tIns="45720" rIns="91440" bIns="45720" rtlCol="0" anchor="b">
             <a:noAutofit/>
           </a:bodyPr>
-          <a:lstStyle/>
-          <a:p>
-            <a:pPr marL="0" indent="0" algn="just">
-              <a:buNone/>
-            </a:pPr>
-            <a:endParaRPr lang="en-GB" sz="1800" dirty="0">
+          <a:lstStyle>
+            <a:lvl1pPr algn="ctr" defTabSz="914400" rtl="0" eaLnBrk="1" latinLnBrk="0" hangingPunct="1">
+              <a:lnSpc>
+                <a:spcPts val="5800"/>
+              </a:lnSpc>
+              <a:spcBef>
+                <a:spcPct val="0"/>
+              </a:spcBef>
+              <a:buNone/>
+              <a:defRPr sz="5400" kern="1200">
+                <a:solidFill>
+                  <a:schemeClr val="tx2"/>
+                </a:solidFill>
+                <a:effectLst>
+                  <a:outerShdw blurRad="63500" dist="38100" dir="5400000" algn="t" rotWithShape="0">
+                    <a:prstClr val="black">
+                      <a:alpha val="25000"/>
+                    </a:prstClr>
+                  </a:outerShdw>
+                </a:effectLst>
+                <a:latin typeface="+mn-lt"/>
+                <a:ea typeface="+mj-ea"/>
+                <a:cs typeface="+mj-cs"/>
+              </a:defRPr>
+            </a:lvl1pPr>
+          </a:lstStyle>
+          <a:p>
+            <a:pPr algn="l"/>
+            <a:r>
+              <a:rPr lang="en-GB" sz="4000" b="1" dirty="0" smtClean="0">
+                <a:solidFill>
+                  <a:schemeClr val="accent6">
+                    <a:lumMod val="50000"/>
+                  </a:schemeClr>
+                </a:solidFill>
+              </a:rPr>
+              <a:t>Task 2: </a:t>
+            </a:r>
+            <a:r>
+              <a:rPr lang="en-GB" sz="2800" b="1" dirty="0" smtClean="0">
+                <a:solidFill>
+                  <a:schemeClr val="accent6">
+                    <a:lumMod val="50000"/>
+                  </a:schemeClr>
+                </a:solidFill>
+              </a:rPr>
+              <a:t>precision VS recall</a:t>
+            </a:r>
+            <a:endParaRPr lang="es-ES" sz="2800" dirty="0">
               <a:solidFill>
-                <a:schemeClr val="tx1"/>
+                <a:schemeClr val="accent6">
+                  <a:lumMod val="50000"/>
+                </a:schemeClr>
               </a:solidFill>
-              <a:latin typeface="+mn-lt"/>
             </a:endParaRPr>
           </a:p>
-          <a:p>
-            <a:pPr marL="0" indent="0" algn="just">
-              <a:buNone/>
-            </a:pPr>
-            <a:endParaRPr lang="en-GB" sz="1800" dirty="0" smtClean="0">
-              <a:solidFill>
-                <a:schemeClr val="tx1"/>
-              </a:solidFill>
-              <a:latin typeface="+mn-lt"/>
-            </a:endParaRPr>
-          </a:p>
-          <a:p>
-            <a:pPr marL="0" indent="0" algn="just">
-              <a:buNone/>
-            </a:pPr>
-            <a:endParaRPr lang="en-GB" sz="1800" dirty="0" smtClean="0">
-              <a:solidFill>
-                <a:schemeClr val="tx1"/>
-              </a:solidFill>
-              <a:latin typeface="+mn-lt"/>
-            </a:endParaRPr>
-          </a:p>
-        </p:txBody>
-      </p:sp>
+        </p:txBody>
+      </p:sp>
+      <p:pic>
+        <p:nvPicPr>
+          <p:cNvPr id="9" name="Imagen 8"/>
+          <p:cNvPicPr>
+            <a:picLocks noChangeAspect="1"/>
+          </p:cNvPicPr>
+          <p:nvPr/>
+        </p:nvPicPr>
+        <p:blipFill>
+          <a:blip r:embed="rId3" cstate="email">
+            <a:extLst>
+              <a:ext uri="{28A0092B-C50C-407E-A947-70E740481C1C}">
+                <a14:useLocalDpi xmlns:a14="http://schemas.microsoft.com/office/drawing/2010/main" val="0"/>
+              </a:ext>
+            </a:extLst>
+          </a:blip>
+          <a:stretch>
+            <a:fillRect/>
+          </a:stretch>
+        </p:blipFill>
+        <p:spPr>
+          <a:xfrm>
+            <a:off x="444827" y="1479368"/>
+            <a:ext cx="2215565" cy="1661673"/>
+          </a:xfrm>
+          <a:prstGeom prst="rect">
+            <a:avLst/>
+          </a:prstGeom>
+        </p:spPr>
+      </p:pic>
+      <p:sp>
+        <p:nvSpPr>
+          <p:cNvPr id="10" name="CuadroTexto 9"/>
+          <p:cNvSpPr txBox="1"/>
+          <p:nvPr/>
+        </p:nvSpPr>
+        <p:spPr>
+          <a:xfrm>
+            <a:off x="364254" y="1091323"/>
+            <a:ext cx="2376709" cy="381899"/>
+          </a:xfrm>
+          <a:prstGeom prst="rect">
+            <a:avLst/>
+          </a:prstGeom>
+          <a:noFill/>
+        </p:spPr>
+        <p:txBody>
+          <a:bodyPr wrap="square" rtlCol="0">
+            <a:spAutoFit/>
+          </a:bodyPr>
+          <a:lstStyle/>
+          <a:p>
+            <a:pPr algn="ctr"/>
+            <a:r>
+              <a:rPr lang="en-US" dirty="0" smtClean="0"/>
+              <a:t>Ground truth</a:t>
+            </a:r>
+            <a:endParaRPr lang="en-US" dirty="0"/>
+          </a:p>
+        </p:txBody>
+      </p:sp>
+      <p:sp>
+        <p:nvSpPr>
+          <p:cNvPr id="12" name="CuadroTexto 11"/>
+          <p:cNvSpPr txBox="1"/>
+          <p:nvPr/>
+        </p:nvSpPr>
+        <p:spPr>
+          <a:xfrm>
+            <a:off x="3644519" y="986956"/>
+            <a:ext cx="2376709" cy="381899"/>
+          </a:xfrm>
+          <a:prstGeom prst="rect">
+            <a:avLst/>
+          </a:prstGeom>
+          <a:noFill/>
+        </p:spPr>
+        <p:txBody>
+          <a:bodyPr wrap="square" rtlCol="0">
+            <a:spAutoFit/>
+          </a:bodyPr>
+          <a:lstStyle/>
+          <a:p>
+            <a:pPr algn="ctr"/>
+            <a:r>
+              <a:rPr lang="en-US" dirty="0" smtClean="0"/>
+              <a:t>Test A (higher recall)</a:t>
+            </a:r>
+            <a:endParaRPr lang="en-US" dirty="0"/>
+          </a:p>
+        </p:txBody>
+      </p:sp>
+      <p:sp>
+        <p:nvSpPr>
+          <p:cNvPr id="8" name="Flecha derecha 7"/>
+          <p:cNvSpPr/>
+          <p:nvPr/>
+        </p:nvSpPr>
+        <p:spPr>
+          <a:xfrm>
+            <a:off x="2814679" y="2111004"/>
+            <a:ext cx="678750" cy="321003"/>
+          </a:xfrm>
+          <a:prstGeom prst="rightArrow">
+            <a:avLst/>
+          </a:prstGeom>
+        </p:spPr>
+        <p:style>
+          <a:lnRef idx="2">
+            <a:schemeClr val="accent1">
+              <a:shade val="50000"/>
+            </a:schemeClr>
+          </a:lnRef>
+          <a:fillRef idx="1">
+            <a:schemeClr val="accent1"/>
+          </a:fillRef>
+          <a:effectRef idx="0">
+            <a:schemeClr val="accent1"/>
+          </a:effectRef>
+          <a:fontRef idx="minor">
+            <a:schemeClr val="lt1"/>
+          </a:fontRef>
+        </p:style>
+        <p:txBody>
+          <a:bodyPr rtlCol="0" anchor="ctr"/>
+          <a:lstStyle/>
+          <a:p>
+            <a:pPr algn="ctr"/>
+            <a:endParaRPr lang="en-US"/>
+          </a:p>
+        </p:txBody>
+      </p:sp>
+      <p:pic>
+        <p:nvPicPr>
+          <p:cNvPr id="13" name="Imagen 12"/>
+          <p:cNvPicPr>
+            <a:picLocks noChangeAspect="1"/>
+          </p:cNvPicPr>
+          <p:nvPr/>
+        </p:nvPicPr>
+        <p:blipFill>
+          <a:blip r:embed="rId4"/>
+          <a:stretch>
+            <a:fillRect/>
+          </a:stretch>
+        </p:blipFill>
+        <p:spPr>
+          <a:xfrm>
+            <a:off x="6249994" y="1420414"/>
+            <a:ext cx="2370315" cy="1779582"/>
+          </a:xfrm>
+          <a:prstGeom prst="rect">
+            <a:avLst/>
+          </a:prstGeom>
+        </p:spPr>
+      </p:pic>
+      <p:sp>
+        <p:nvSpPr>
+          <p:cNvPr id="16" name="CuadroTexto 15"/>
+          <p:cNvSpPr txBox="1"/>
+          <p:nvPr/>
+        </p:nvSpPr>
+        <p:spPr>
+          <a:xfrm>
+            <a:off x="6116119" y="1004563"/>
+            <a:ext cx="2691795" cy="369332"/>
+          </a:xfrm>
+          <a:prstGeom prst="rect">
+            <a:avLst/>
+          </a:prstGeom>
+          <a:noFill/>
+        </p:spPr>
+        <p:txBody>
+          <a:bodyPr wrap="square" rtlCol="0">
+            <a:spAutoFit/>
+          </a:bodyPr>
+          <a:lstStyle/>
+          <a:p>
+            <a:pPr algn="ctr"/>
+            <a:r>
+              <a:rPr lang="en-US" dirty="0" smtClean="0"/>
+              <a:t>Test B (higher precision)</a:t>
+            </a:r>
+            <a:endParaRPr lang="en-US" dirty="0"/>
+          </a:p>
+        </p:txBody>
+      </p:sp>
+      <p:sp>
+        <p:nvSpPr>
+          <p:cNvPr id="17" name="CuadroTexto 16"/>
+          <p:cNvSpPr txBox="1"/>
+          <p:nvPr/>
+        </p:nvSpPr>
+        <p:spPr>
+          <a:xfrm>
+            <a:off x="2525719" y="1859596"/>
+            <a:ext cx="1256671" cy="276999"/>
+          </a:xfrm>
+          <a:prstGeom prst="rect">
+            <a:avLst/>
+          </a:prstGeom>
+          <a:noFill/>
+        </p:spPr>
+        <p:txBody>
+          <a:bodyPr wrap="square" rtlCol="0">
+            <a:spAutoFit/>
+          </a:bodyPr>
+          <a:lstStyle/>
+          <a:p>
+            <a:pPr algn="ctr"/>
+            <a:r>
+              <a:rPr lang="en-US" sz="1200" dirty="0" smtClean="0"/>
+              <a:t>Segmentation</a:t>
+            </a:r>
+            <a:endParaRPr lang="en-US" sz="1200" dirty="0"/>
+          </a:p>
+        </p:txBody>
+      </p:sp>
+      <p:sp>
+        <p:nvSpPr>
+          <p:cNvPr id="15" name="CuadroTexto 14"/>
+          <p:cNvSpPr txBox="1"/>
+          <p:nvPr/>
+        </p:nvSpPr>
+        <p:spPr>
+          <a:xfrm>
+            <a:off x="560717" y="3761117"/>
+            <a:ext cx="8059592" cy="2031325"/>
+          </a:xfrm>
+          <a:prstGeom prst="rect">
+            <a:avLst/>
+          </a:prstGeom>
+          <a:noFill/>
+        </p:spPr>
+        <p:txBody>
+          <a:bodyPr wrap="square" rtlCol="0">
+            <a:spAutoFit/>
+          </a:bodyPr>
+          <a:lstStyle/>
+          <a:p>
+            <a:pPr algn="just"/>
+            <a:r>
+              <a:rPr lang="en-US" dirty="0" smtClean="0"/>
+              <a:t>Test A segmentation has a higher recall because it misses less foreground pixels (true samples). However, it misclassifies background pixels (false samples) as foreground (FP) and, consequently, the precision lowers.</a:t>
+            </a:r>
+          </a:p>
+          <a:p>
+            <a:pPr algn="just"/>
+            <a:endParaRPr lang="en-US" dirty="0"/>
+          </a:p>
+          <a:p>
+            <a:pPr algn="just"/>
+            <a:r>
+              <a:rPr lang="en-US" dirty="0" smtClean="0"/>
+              <a:t>On the other hand, Test B has a higher precision because most of the positive pixels (</a:t>
+            </a:r>
+            <a:r>
+              <a:rPr lang="en-US" dirty="0" err="1" smtClean="0"/>
+              <a:t>TP+FP</a:t>
+            </a:r>
+            <a:r>
+              <a:rPr lang="en-US" dirty="0" smtClean="0"/>
+              <a:t>) are foreground (</a:t>
+            </a:r>
+            <a:r>
+              <a:rPr lang="en-US" dirty="0" err="1" smtClean="0"/>
+              <a:t>TP</a:t>
+            </a:r>
+            <a:r>
+              <a:rPr lang="en-US" dirty="0" smtClean="0"/>
+              <a:t>) at a cost of having foreground pixels incorrectly classified as background (FN), which lowers the recall.</a:t>
+            </a:r>
+            <a:endParaRPr lang="en-US" dirty="0"/>
+          </a:p>
+        </p:txBody>
+      </p:sp>
+      <p:pic>
+        <p:nvPicPr>
+          <p:cNvPr id="19" name="Imagen 18"/>
+          <p:cNvPicPr>
+            <a:picLocks noChangeAspect="1"/>
+          </p:cNvPicPr>
+          <p:nvPr/>
+        </p:nvPicPr>
+        <p:blipFill>
+          <a:blip r:embed="rId5"/>
+          <a:stretch>
+            <a:fillRect/>
+          </a:stretch>
+        </p:blipFill>
+        <p:spPr>
+          <a:xfrm>
+            <a:off x="3745467" y="1414018"/>
+            <a:ext cx="2370651" cy="1794605"/>
+          </a:xfrm>
+          <a:prstGeom prst="rect">
+            <a:avLst/>
+          </a:prstGeom>
+        </p:spPr>
+      </p:pic>
     </p:spTree>
     <p:extLst>
       <p:ext uri="{BB962C8B-B14F-4D97-AF65-F5344CB8AC3E}">
@@ -5100,39 +5582,6 @@
           <a:chExt cx="0" cy="0"/>
         </a:xfrm>
       </p:grpSpPr>
-      <p:sp>
-        <p:nvSpPr>
-          <p:cNvPr id="2" name="Título 1"/>
-          <p:cNvSpPr>
-            <a:spLocks noGrp="1"/>
-          </p:cNvSpPr>
-          <p:nvPr>
-            <p:ph type="title"/>
-          </p:nvPr>
-        </p:nvSpPr>
-        <p:spPr>
-          <a:xfrm>
-            <a:off x="469065" y="377580"/>
-            <a:ext cx="4740119" cy="686515"/>
-          </a:xfrm>
-        </p:spPr>
-        <p:txBody>
-          <a:bodyPr/>
-          <a:lstStyle/>
-          <a:p>
-            <a:pPr algn="l"/>
-            <a:r>
-              <a:rPr lang="en-GB" sz="4000" b="1" dirty="0" smtClean="0">
-                <a:solidFill>
-                  <a:srgbClr val="660066"/>
-                </a:solidFill>
-              </a:rPr>
-              <a:t>Task 3</a:t>
-            </a:r>
-            <a:endParaRPr lang="es-ES" sz="4000" dirty="0"/>
-          </a:p>
-        </p:txBody>
-      </p:sp>
       <p:pic>
         <p:nvPicPr>
           <p:cNvPr id="4" name="Imagen 3" descr="Captura de pantalla 2015-10-17 a las 23.22.37.png"/>
@@ -5216,6 +5665,155 @@
                 <a:schemeClr val="tx1"/>
               </a:solidFill>
               <a:latin typeface="+mn-lt"/>
+            </a:endParaRPr>
+          </a:p>
+        </p:txBody>
+      </p:sp>
+      <p:sp>
+        <p:nvSpPr>
+          <p:cNvPr id="6" name="Título 1"/>
+          <p:cNvSpPr txBox="1">
+            <a:spLocks/>
+          </p:cNvSpPr>
+          <p:nvPr/>
+        </p:nvSpPr>
+        <p:spPr>
+          <a:xfrm>
+            <a:off x="469065" y="377580"/>
+            <a:ext cx="7053399" cy="686515"/>
+          </a:xfrm>
+          <a:prstGeom prst="rect">
+            <a:avLst/>
+          </a:prstGeom>
+        </p:spPr>
+        <p:txBody>
+          <a:bodyPr vert="horz" lIns="91440" tIns="45720" rIns="91440" bIns="45720" rtlCol="0" anchor="b">
+            <a:noAutofit/>
+          </a:bodyPr>
+          <a:lstStyle>
+            <a:lvl1pPr algn="ctr" defTabSz="914400" rtl="0" eaLnBrk="1" latinLnBrk="0" hangingPunct="1">
+              <a:lnSpc>
+                <a:spcPts val="5800"/>
+              </a:lnSpc>
+              <a:spcBef>
+                <a:spcPct val="0"/>
+              </a:spcBef>
+              <a:buNone/>
+              <a:defRPr sz="5400" kern="1200">
+                <a:solidFill>
+                  <a:schemeClr val="tx2"/>
+                </a:solidFill>
+                <a:effectLst>
+                  <a:outerShdw blurRad="63500" dist="38100" dir="5400000" algn="t" rotWithShape="0">
+                    <a:prstClr val="black">
+                      <a:alpha val="25000"/>
+                    </a:prstClr>
+                  </a:outerShdw>
+                </a:effectLst>
+                <a:latin typeface="+mn-lt"/>
+                <a:ea typeface="+mj-ea"/>
+                <a:cs typeface="+mj-cs"/>
+              </a:defRPr>
+            </a:lvl1pPr>
+          </a:lstStyle>
+          <a:p>
+            <a:pPr algn="l"/>
+            <a:r>
+              <a:rPr lang="en-GB" sz="4000" b="1" dirty="0" smtClean="0">
+                <a:solidFill>
+                  <a:schemeClr val="accent6">
+                    <a:lumMod val="50000"/>
+                  </a:schemeClr>
+                </a:solidFill>
+              </a:rPr>
+              <a:t>Task 3:</a:t>
+            </a:r>
+            <a:r>
+              <a:rPr lang="es-ES" sz="2800" dirty="0" smtClean="0">
+                <a:solidFill>
+                  <a:schemeClr val="accent6">
+                    <a:lumMod val="50000"/>
+                  </a:schemeClr>
+                </a:solidFill>
+              </a:rPr>
+              <a:t> </a:t>
+            </a:r>
+            <a:r>
+              <a:rPr lang="es-ES" sz="2800" dirty="0" err="1" smtClean="0">
+                <a:solidFill>
+                  <a:schemeClr val="accent6">
+                    <a:lumMod val="50000"/>
+                  </a:schemeClr>
+                </a:solidFill>
+              </a:rPr>
+              <a:t>frame</a:t>
+            </a:r>
+            <a:r>
+              <a:rPr lang="es-ES" sz="2800" dirty="0" smtClean="0">
+                <a:solidFill>
+                  <a:schemeClr val="accent6">
+                    <a:lumMod val="50000"/>
+                  </a:schemeClr>
+                </a:solidFill>
+              </a:rPr>
+              <a:t> </a:t>
+            </a:r>
+            <a:r>
+              <a:rPr lang="es-ES" sz="2800" dirty="0" err="1" smtClean="0">
+                <a:solidFill>
+                  <a:schemeClr val="accent6">
+                    <a:lumMod val="50000"/>
+                  </a:schemeClr>
+                </a:solidFill>
+              </a:rPr>
+              <a:t>by</a:t>
+            </a:r>
+            <a:r>
+              <a:rPr lang="es-ES" sz="2800" dirty="0" smtClean="0">
+                <a:solidFill>
+                  <a:schemeClr val="accent6">
+                    <a:lumMod val="50000"/>
+                  </a:schemeClr>
+                </a:solidFill>
+              </a:rPr>
+              <a:t> </a:t>
+            </a:r>
+            <a:r>
+              <a:rPr lang="es-ES" sz="2800" dirty="0" err="1" smtClean="0">
+                <a:solidFill>
+                  <a:schemeClr val="accent6">
+                    <a:lumMod val="50000"/>
+                  </a:schemeClr>
+                </a:solidFill>
+              </a:rPr>
+              <a:t>frame</a:t>
+            </a:r>
+            <a:r>
+              <a:rPr lang="es-ES" sz="2800" dirty="0" smtClean="0">
+                <a:solidFill>
+                  <a:schemeClr val="accent6">
+                    <a:lumMod val="50000"/>
+                  </a:schemeClr>
+                </a:solidFill>
+              </a:rPr>
+              <a:t> </a:t>
+            </a:r>
+            <a:r>
+              <a:rPr lang="es-ES" sz="2800" dirty="0" err="1" smtClean="0">
+                <a:solidFill>
+                  <a:schemeClr val="accent6">
+                    <a:lumMod val="50000"/>
+                  </a:schemeClr>
+                </a:solidFill>
+              </a:rPr>
+              <a:t>metrics</a:t>
+            </a:r>
+            <a:endParaRPr lang="en-GB" sz="4000" b="1" dirty="0" smtClean="0">
+              <a:solidFill>
+                <a:schemeClr val="accent6">
+                  <a:lumMod val="50000"/>
+                </a:schemeClr>
+              </a:solidFill>
             </a:endParaRPr>
           </a:p>
         </p:txBody>
@@ -5257,39 +5855,6 @@
           <a:chExt cx="0" cy="0"/>
         </a:xfrm>
       </p:grpSpPr>
-      <p:sp>
-        <p:nvSpPr>
-          <p:cNvPr id="2" name="Título 1"/>
-          <p:cNvSpPr>
-            <a:spLocks noGrp="1"/>
-          </p:cNvSpPr>
-          <p:nvPr>
-            <p:ph type="title"/>
-          </p:nvPr>
-        </p:nvSpPr>
-        <p:spPr>
-          <a:xfrm>
-            <a:off x="469065" y="377580"/>
-            <a:ext cx="4740119" cy="686515"/>
-          </a:xfrm>
-        </p:spPr>
-        <p:txBody>
-          <a:bodyPr/>
-          <a:lstStyle/>
-          <a:p>
-            <a:pPr algn="l"/>
-            <a:r>
-              <a:rPr lang="en-GB" sz="4000" b="1" dirty="0" smtClean="0">
-                <a:solidFill>
-                  <a:srgbClr val="660066"/>
-                </a:solidFill>
-              </a:rPr>
-              <a:t>Task 4 (Optional)</a:t>
-            </a:r>
-            <a:endParaRPr lang="es-ES" sz="4000" dirty="0"/>
-          </a:p>
-        </p:txBody>
-      </p:sp>
       <p:pic>
         <p:nvPicPr>
           <p:cNvPr id="4" name="Imagen 3" descr="Captura de pantalla 2015-10-17 a las 23.22.37.png"/>
@@ -5373,6 +5938,85 @@
                 <a:schemeClr val="tx1"/>
               </a:solidFill>
               <a:latin typeface="+mn-lt"/>
+            </a:endParaRPr>
+          </a:p>
+        </p:txBody>
+      </p:sp>
+      <p:sp>
+        <p:nvSpPr>
+          <p:cNvPr id="6" name="Título 1"/>
+          <p:cNvSpPr txBox="1">
+            <a:spLocks/>
+          </p:cNvSpPr>
+          <p:nvPr/>
+        </p:nvSpPr>
+        <p:spPr>
+          <a:xfrm>
+            <a:off x="469065" y="377580"/>
+            <a:ext cx="7053399" cy="686515"/>
+          </a:xfrm>
+          <a:prstGeom prst="rect">
+            <a:avLst/>
+          </a:prstGeom>
+        </p:spPr>
+        <p:txBody>
+          <a:bodyPr vert="horz" lIns="91440" tIns="45720" rIns="91440" bIns="45720" rtlCol="0" anchor="b">
+            <a:noAutofit/>
+          </a:bodyPr>
+          <a:lstStyle>
+            <a:lvl1pPr algn="ctr" defTabSz="914400" rtl="0" eaLnBrk="1" latinLnBrk="0" hangingPunct="1">
+              <a:lnSpc>
+                <a:spcPts val="5800"/>
+              </a:lnSpc>
+              <a:spcBef>
+                <a:spcPct val="0"/>
+              </a:spcBef>
+              <a:buNone/>
+              <a:defRPr sz="5400" kern="1200">
+                <a:solidFill>
+                  <a:schemeClr val="tx2"/>
+                </a:solidFill>
+                <a:effectLst>
+                  <a:outerShdw blurRad="63500" dist="38100" dir="5400000" algn="t" rotWithShape="0">
+                    <a:prstClr val="black">
+                      <a:alpha val="25000"/>
+                    </a:prstClr>
+                  </a:outerShdw>
+                </a:effectLst>
+                <a:latin typeface="+mn-lt"/>
+                <a:ea typeface="+mj-ea"/>
+                <a:cs typeface="+mj-cs"/>
+              </a:defRPr>
+            </a:lvl1pPr>
+          </a:lstStyle>
+          <a:p>
+            <a:pPr algn="l"/>
+            <a:r>
+              <a:rPr lang="en-GB" sz="4000" b="1" dirty="0" smtClean="0">
+                <a:solidFill>
+                  <a:schemeClr val="accent6">
+                    <a:lumMod val="50000"/>
+                  </a:schemeClr>
+                </a:solidFill>
+              </a:rPr>
+              <a:t>Task 4:</a:t>
+            </a:r>
+            <a:r>
+              <a:rPr lang="es-ES" sz="2800" dirty="0" smtClean="0">
+                <a:solidFill>
+                  <a:schemeClr val="accent6">
+                    <a:lumMod val="50000"/>
+                  </a:schemeClr>
+                </a:solidFill>
+              </a:rPr>
+              <a:t> </a:t>
+            </a:r>
+            <a:endParaRPr lang="en-GB" sz="4000" b="1" dirty="0" smtClean="0">
+              <a:solidFill>
+                <a:schemeClr val="accent6">
+                  <a:lumMod val="50000"/>
+                </a:schemeClr>
+              </a:solidFill>
             </a:endParaRPr>
           </a:p>
         </p:txBody>
@@ -5414,39 +6058,6 @@
           <a:chExt cx="0" cy="0"/>
         </a:xfrm>
       </p:grpSpPr>
-      <p:sp>
-        <p:nvSpPr>
-          <p:cNvPr id="2" name="Título 1"/>
-          <p:cNvSpPr>
-            <a:spLocks noGrp="1"/>
-          </p:cNvSpPr>
-          <p:nvPr>
-            <p:ph type="title"/>
-          </p:nvPr>
-        </p:nvSpPr>
-        <p:spPr>
-          <a:xfrm>
-            <a:off x="469065" y="377580"/>
-            <a:ext cx="4740119" cy="686515"/>
-          </a:xfrm>
-        </p:spPr>
-        <p:txBody>
-          <a:bodyPr/>
-          <a:lstStyle/>
-          <a:p>
-            <a:pPr algn="l"/>
-            <a:r>
-              <a:rPr lang="en-GB" sz="4000" b="1" dirty="0" smtClean="0">
-                <a:solidFill>
-                  <a:srgbClr val="660066"/>
-                </a:solidFill>
-              </a:rPr>
-              <a:t>Task 5 (Optional)</a:t>
-            </a:r>
-            <a:endParaRPr lang="es-ES" sz="4000" dirty="0"/>
-          </a:p>
-        </p:txBody>
-      </p:sp>
       <p:pic>
         <p:nvPicPr>
           <p:cNvPr id="4" name="Imagen 3" descr="Captura de pantalla 2015-10-17 a las 23.22.37.png"/>
@@ -5530,6 +6141,85 @@
                 <a:schemeClr val="tx1"/>
               </a:solidFill>
               <a:latin typeface="+mn-lt"/>
+            </a:endParaRPr>
+          </a:p>
+        </p:txBody>
+      </p:sp>
+      <p:sp>
+        <p:nvSpPr>
+          <p:cNvPr id="6" name="Título 1"/>
+          <p:cNvSpPr txBox="1">
+            <a:spLocks/>
+          </p:cNvSpPr>
+          <p:nvPr/>
+        </p:nvSpPr>
+        <p:spPr>
+          <a:xfrm>
+            <a:off x="469065" y="377580"/>
+            <a:ext cx="7053399" cy="686515"/>
+          </a:xfrm>
+          <a:prstGeom prst="rect">
+            <a:avLst/>
+          </a:prstGeom>
+        </p:spPr>
+        <p:txBody>
+          <a:bodyPr vert="horz" lIns="91440" tIns="45720" rIns="91440" bIns="45720" rtlCol="0" anchor="b">
+            <a:noAutofit/>
+          </a:bodyPr>
+          <a:lstStyle>
+            <a:lvl1pPr algn="ctr" defTabSz="914400" rtl="0" eaLnBrk="1" latinLnBrk="0" hangingPunct="1">
+              <a:lnSpc>
+                <a:spcPts val="5800"/>
+              </a:lnSpc>
+              <a:spcBef>
+                <a:spcPct val="0"/>
+              </a:spcBef>
+              <a:buNone/>
+              <a:defRPr sz="5400" kern="1200">
+                <a:solidFill>
+                  <a:schemeClr val="tx2"/>
+                </a:solidFill>
+                <a:effectLst>
+                  <a:outerShdw blurRad="63500" dist="38100" dir="5400000" algn="t" rotWithShape="0">
+                    <a:prstClr val="black">
+                      <a:alpha val="25000"/>
+                    </a:prstClr>
+                  </a:outerShdw>
+                </a:effectLst>
+                <a:latin typeface="+mn-lt"/>
+                <a:ea typeface="+mj-ea"/>
+                <a:cs typeface="+mj-cs"/>
+              </a:defRPr>
+            </a:lvl1pPr>
+          </a:lstStyle>
+          <a:p>
+            <a:pPr algn="l"/>
+            <a:r>
+              <a:rPr lang="en-GB" sz="4000" b="1" dirty="0" smtClean="0">
+                <a:solidFill>
+                  <a:schemeClr val="accent6">
+                    <a:lumMod val="50000"/>
+                  </a:schemeClr>
+                </a:solidFill>
+              </a:rPr>
+              <a:t>Task 5:</a:t>
+            </a:r>
+            <a:r>
+              <a:rPr lang="es-ES" sz="2800" dirty="0" smtClean="0">
+                <a:solidFill>
+                  <a:schemeClr val="accent6">
+                    <a:lumMod val="50000"/>
+                  </a:schemeClr>
+                </a:solidFill>
+              </a:rPr>
+              <a:t> </a:t>
+            </a:r>
+            <a:endParaRPr lang="en-GB" sz="4000" b="1" dirty="0" smtClean="0">
+              <a:solidFill>
+                <a:schemeClr val="accent6">
+                  <a:lumMod val="50000"/>
+                </a:schemeClr>
+              </a:solidFill>
             </a:endParaRPr>
           </a:p>
         </p:txBody>
@@ -5573,15 +6263,15 @@
       </p:grpSpPr>
       <p:pic>
         <p:nvPicPr>
-          <p:cNvPr id="4" name="Imagen 3" descr="Captura de pantalla 2015-10-17 a las 22.59.28.png"/>
+          <p:cNvPr id="4" name="Imagen 3" descr="Captura de pantalla 2015-10-17 a las 23.22.37.png"/>
           <p:cNvPicPr>
             <a:picLocks noChangeAspect="1"/>
           </p:cNvPicPr>
           <p:nvPr/>
         </p:nvPicPr>
         <p:blipFill>
-          <a:blip r:embed="rId2">
-            <a:alphaModFix amt="80000"/>
+          <a:blip r:embed="rId2" cstate="email">
+            <a:alphaModFix amt="88000"/>
             <a:extLst>
               <a:ext uri="{28A0092B-C50C-407E-A947-70E740481C1C}">
                 <a14:useLocalDpi xmlns:a14="http://schemas.microsoft.com/office/drawing/2010/main" val="0"/>
@@ -5594,24 +6284,356 @@
         </p:blipFill>
         <p:spPr>
           <a:xfrm>
-            <a:off x="0" y="-11442"/>
-            <a:ext cx="9144000" cy="2513880"/>
+            <a:off x="865269" y="6406536"/>
+            <a:ext cx="4714843" cy="265273"/>
           </a:xfrm>
           <a:prstGeom prst="rect">
             <a:avLst/>
           </a:prstGeom>
-          <a:ln>
-            <a:noFill/>
-          </a:ln>
-          <a:effectLst>
-            <a:softEdge rad="112500"/>
-          </a:effectLst>
         </p:spPr>
       </p:pic>
+      <p:sp>
+        <p:nvSpPr>
+          <p:cNvPr id="18" name="Marcador de contenido 2"/>
+          <p:cNvSpPr>
+            <a:spLocks noGrp="1"/>
+          </p:cNvSpPr>
+          <p:nvPr>
+            <p:ph idx="1"/>
+          </p:nvPr>
+        </p:nvSpPr>
+        <p:spPr>
+          <a:xfrm>
+            <a:off x="621790" y="1434071"/>
+            <a:ext cx="7569769" cy="774220"/>
+          </a:xfrm>
+        </p:spPr>
+        <p:txBody>
+          <a:bodyPr>
+            <a:noAutofit/>
+          </a:bodyPr>
+          <a:lstStyle/>
+          <a:p>
+            <a:pPr marL="0" indent="0" algn="just">
+              <a:buNone/>
+            </a:pPr>
+            <a:endParaRPr lang="en-GB" sz="1800" dirty="0">
+              <a:solidFill>
+                <a:schemeClr val="tx1"/>
+              </a:solidFill>
+              <a:latin typeface="+mn-lt"/>
+            </a:endParaRPr>
+          </a:p>
+          <a:p>
+            <a:pPr marL="0" indent="0" algn="just">
+              <a:buNone/>
+            </a:pPr>
+            <a:endParaRPr lang="en-GB" sz="1800" dirty="0" smtClean="0">
+              <a:solidFill>
+                <a:schemeClr val="tx1"/>
+              </a:solidFill>
+              <a:latin typeface="+mn-lt"/>
+            </a:endParaRPr>
+          </a:p>
+          <a:p>
+            <a:pPr marL="0" indent="0" algn="just">
+              <a:buNone/>
+            </a:pPr>
+            <a:endParaRPr lang="en-GB" sz="1800" dirty="0" smtClean="0">
+              <a:solidFill>
+                <a:schemeClr val="tx1"/>
+              </a:solidFill>
+              <a:latin typeface="+mn-lt"/>
+            </a:endParaRPr>
+          </a:p>
+        </p:txBody>
+      </p:sp>
+      <p:sp>
+        <p:nvSpPr>
+          <p:cNvPr id="6" name="Título 1"/>
+          <p:cNvSpPr txBox="1">
+            <a:spLocks/>
+          </p:cNvSpPr>
+          <p:nvPr/>
+        </p:nvSpPr>
+        <p:spPr>
+          <a:xfrm>
+            <a:off x="469065" y="377580"/>
+            <a:ext cx="7053399" cy="686515"/>
+          </a:xfrm>
+          <a:prstGeom prst="rect">
+            <a:avLst/>
+          </a:prstGeom>
+        </p:spPr>
+        <p:txBody>
+          <a:bodyPr vert="horz" lIns="91440" tIns="45720" rIns="91440" bIns="45720" rtlCol="0" anchor="b">
+            <a:noAutofit/>
+          </a:bodyPr>
+          <a:lstStyle>
+            <a:lvl1pPr algn="ctr" defTabSz="914400" rtl="0" eaLnBrk="1" latinLnBrk="0" hangingPunct="1">
+              <a:lnSpc>
+                <a:spcPts val="5800"/>
+              </a:lnSpc>
+              <a:spcBef>
+                <a:spcPct val="0"/>
+              </a:spcBef>
+              <a:buNone/>
+              <a:defRPr sz="5400" kern="1200">
+                <a:solidFill>
+                  <a:schemeClr val="tx2"/>
+                </a:solidFill>
+                <a:effectLst>
+                  <a:outerShdw blurRad="63500" dist="38100" dir="5400000" algn="t" rotWithShape="0">
+                    <a:prstClr val="black">
+                      <a:alpha val="25000"/>
+                    </a:prstClr>
+                  </a:outerShdw>
+                </a:effectLst>
+                <a:latin typeface="+mn-lt"/>
+                <a:ea typeface="+mj-ea"/>
+                <a:cs typeface="+mj-cs"/>
+              </a:defRPr>
+            </a:lvl1pPr>
+          </a:lstStyle>
+          <a:p>
+            <a:pPr algn="l"/>
+            <a:r>
+              <a:rPr lang="en-GB" sz="4000" b="1" dirty="0" smtClean="0">
+                <a:solidFill>
+                  <a:schemeClr val="accent6">
+                    <a:lumMod val="50000"/>
+                  </a:schemeClr>
+                </a:solidFill>
+              </a:rPr>
+              <a:t>Task 6:</a:t>
+            </a:r>
+            <a:r>
+              <a:rPr lang="es-ES" sz="2800" dirty="0" smtClean="0">
+                <a:solidFill>
+                  <a:schemeClr val="accent6">
+                    <a:lumMod val="50000"/>
+                  </a:schemeClr>
+                </a:solidFill>
+              </a:rPr>
+              <a:t> </a:t>
+            </a:r>
+            <a:endParaRPr lang="en-GB" sz="4000" b="1" dirty="0" smtClean="0">
+              <a:solidFill>
+                <a:schemeClr val="accent6">
+                  <a:lumMod val="50000"/>
+                </a:schemeClr>
+              </a:solidFill>
+            </a:endParaRPr>
+          </a:p>
+        </p:txBody>
+      </p:sp>
     </p:spTree>
     <p:extLst>
       <p:ext uri="{BB962C8B-B14F-4D97-AF65-F5344CB8AC3E}">
-        <p14:creationId xmlns:p14="http://schemas.microsoft.com/office/powerpoint/2010/main" val="14960951"/>
+        <p14:creationId xmlns:p14="http://schemas.microsoft.com/office/powerpoint/2010/main" val="3161707260"/>
+      </p:ext>
+    </p:extLst>
+  </p:cSld>
+  <p:clrMapOvr>
+    <a:masterClrMapping/>
+  </p:clrMapOvr>
+  <p:timing>
+    <p:tnLst>
+      <p:par>
+        <p:cTn id="1" dur="indefinite" restart="never" nodeType="tmRoot"/>
+      </p:par>
+    </p:tnLst>
+  </p:timing>
+</p:sld>
+</file>
+
+<file path=ppt/slides/slide9.xml><?xml version="1.0" encoding="utf-8"?>
+<p:sld xmlns:a="http://schemas.openxmlformats.org/drawingml/2006/main" xmlns:r="http://schemas.openxmlformats.org/officeDocument/2006/relationships" xmlns:p="http://schemas.openxmlformats.org/presentationml/2006/main">
+  <p:cSld>
+    <p:spTree>
+      <p:nvGrpSpPr>
+        <p:cNvPr id="1" name=""/>
+        <p:cNvGrpSpPr/>
+        <p:nvPr/>
+      </p:nvGrpSpPr>
+      <p:grpSpPr>
+        <a:xfrm>
+          <a:off x="0" y="0"/>
+          <a:ext cx="0" cy="0"/>
+          <a:chOff x="0" y="0"/>
+          <a:chExt cx="0" cy="0"/>
+        </a:xfrm>
+      </p:grpSpPr>
+      <p:pic>
+        <p:nvPicPr>
+          <p:cNvPr id="4" name="Imagen 3" descr="Captura de pantalla 2015-10-17 a las 23.22.37.png"/>
+          <p:cNvPicPr>
+            <a:picLocks noChangeAspect="1"/>
+          </p:cNvPicPr>
+          <p:nvPr/>
+        </p:nvPicPr>
+        <p:blipFill>
+          <a:blip r:embed="rId2" cstate="email">
+            <a:alphaModFix amt="88000"/>
+            <a:extLst>
+              <a:ext uri="{28A0092B-C50C-407E-A947-70E740481C1C}">
+                <a14:useLocalDpi xmlns:a14="http://schemas.microsoft.com/office/drawing/2010/main" val="0"/>
+              </a:ext>
+            </a:extLst>
+          </a:blip>
+          <a:stretch>
+            <a:fillRect/>
+          </a:stretch>
+        </p:blipFill>
+        <p:spPr>
+          <a:xfrm>
+            <a:off x="865269" y="6406536"/>
+            <a:ext cx="4714843" cy="265273"/>
+          </a:xfrm>
+          <a:prstGeom prst="rect">
+            <a:avLst/>
+          </a:prstGeom>
+        </p:spPr>
+      </p:pic>
+      <p:sp>
+        <p:nvSpPr>
+          <p:cNvPr id="18" name="Marcador de contenido 2"/>
+          <p:cNvSpPr>
+            <a:spLocks noGrp="1"/>
+          </p:cNvSpPr>
+          <p:nvPr>
+            <p:ph idx="1"/>
+          </p:nvPr>
+        </p:nvSpPr>
+        <p:spPr>
+          <a:xfrm>
+            <a:off x="621790" y="1434071"/>
+            <a:ext cx="7569769" cy="774220"/>
+          </a:xfrm>
+        </p:spPr>
+        <p:txBody>
+          <a:bodyPr>
+            <a:noAutofit/>
+          </a:bodyPr>
+          <a:lstStyle/>
+          <a:p>
+            <a:pPr marL="0" indent="0" algn="just">
+              <a:buNone/>
+            </a:pPr>
+            <a:endParaRPr lang="en-GB" sz="1800" dirty="0">
+              <a:solidFill>
+                <a:schemeClr val="tx1"/>
+              </a:solidFill>
+              <a:latin typeface="+mn-lt"/>
+            </a:endParaRPr>
+          </a:p>
+          <a:p>
+            <a:pPr marL="0" indent="0" algn="just">
+              <a:buNone/>
+            </a:pPr>
+            <a:endParaRPr lang="en-GB" sz="1800" dirty="0" smtClean="0">
+              <a:solidFill>
+                <a:schemeClr val="tx1"/>
+              </a:solidFill>
+              <a:latin typeface="+mn-lt"/>
+            </a:endParaRPr>
+          </a:p>
+          <a:p>
+            <a:pPr marL="0" indent="0" algn="just">
+              <a:buNone/>
+            </a:pPr>
+            <a:endParaRPr lang="en-GB" sz="1800" dirty="0" smtClean="0">
+              <a:solidFill>
+                <a:schemeClr val="tx1"/>
+              </a:solidFill>
+              <a:latin typeface="+mn-lt"/>
+            </a:endParaRPr>
+          </a:p>
+        </p:txBody>
+      </p:sp>
+      <p:sp>
+        <p:nvSpPr>
+          <p:cNvPr id="6" name="Título 1"/>
+          <p:cNvSpPr txBox="1">
+            <a:spLocks/>
+          </p:cNvSpPr>
+          <p:nvPr/>
+        </p:nvSpPr>
+        <p:spPr>
+          <a:xfrm>
+            <a:off x="469065" y="377580"/>
+            <a:ext cx="7053399" cy="686515"/>
+          </a:xfrm>
+          <a:prstGeom prst="rect">
+            <a:avLst/>
+          </a:prstGeom>
+        </p:spPr>
+        <p:txBody>
+          <a:bodyPr vert="horz" lIns="91440" tIns="45720" rIns="91440" bIns="45720" rtlCol="0" anchor="b">
+            <a:noAutofit/>
+          </a:bodyPr>
+          <a:lstStyle>
+            <a:lvl1pPr algn="ctr" defTabSz="914400" rtl="0" eaLnBrk="1" latinLnBrk="0" hangingPunct="1">
+              <a:lnSpc>
+                <a:spcPts val="5800"/>
+              </a:lnSpc>
+              <a:spcBef>
+                <a:spcPct val="0"/>
+              </a:spcBef>
+              <a:buNone/>
+              <a:defRPr sz="5400" kern="1200">
+                <a:solidFill>
+                  <a:schemeClr val="tx2"/>
+                </a:solidFill>
+                <a:effectLst>
+                  <a:outerShdw blurRad="63500" dist="38100" dir="5400000" algn="t" rotWithShape="0">
+                    <a:prstClr val="black">
+                      <a:alpha val="25000"/>
+                    </a:prstClr>
+                  </a:outerShdw>
+                </a:effectLst>
+                <a:latin typeface="+mn-lt"/>
+                <a:ea typeface="+mj-ea"/>
+                <a:cs typeface="+mj-cs"/>
+              </a:defRPr>
+            </a:lvl1pPr>
+          </a:lstStyle>
+          <a:p>
+            <a:pPr algn="l"/>
+            <a:r>
+              <a:rPr lang="en-GB" sz="4000" b="1" dirty="0" smtClean="0">
+                <a:solidFill>
+                  <a:schemeClr val="accent6">
+                    <a:lumMod val="50000"/>
+                  </a:schemeClr>
+                </a:solidFill>
+              </a:rPr>
+              <a:t>Task 7:</a:t>
+            </a:r>
+            <a:r>
+              <a:rPr lang="es-ES" sz="2800" dirty="0" smtClean="0">
+                <a:solidFill>
+                  <a:schemeClr val="accent6">
+                    <a:lumMod val="50000"/>
+                  </a:schemeClr>
+                </a:solidFill>
+              </a:rPr>
+              <a:t> </a:t>
+            </a:r>
+            <a:endParaRPr lang="en-GB" sz="4000" b="1" dirty="0" smtClean="0">
+              <a:solidFill>
+                <a:schemeClr val="accent6">
+                  <a:lumMod val="50000"/>
+                </a:schemeClr>
+              </a:solidFill>
+            </a:endParaRPr>
+          </a:p>
+        </p:txBody>
+      </p:sp>
+    </p:spTree>
+    <p:extLst>
+      <p:ext uri="{BB962C8B-B14F-4D97-AF65-F5344CB8AC3E}">
+        <p14:creationId xmlns:p14="http://schemas.microsoft.com/office/powerpoint/2010/main" val="3916331693"/>
       </p:ext>
     </p:extLst>
   </p:cSld>

</xml_diff>

<commit_message>
Slide task 3 in construction.
</commit_message>
<xml_diff>
--- a/block1/doc/SlidesB1.pptx
+++ b/block1/doc/SlidesB1.pptx
@@ -5815,6 +5815,182 @@
                 </a:schemeClr>
               </a:solidFill>
             </a:endParaRPr>
+          </a:p>
+        </p:txBody>
+      </p:sp>
+      <p:pic>
+        <p:nvPicPr>
+          <p:cNvPr id="7" name="Imagen 6"/>
+          <p:cNvPicPr>
+            <a:picLocks noChangeAspect="1"/>
+          </p:cNvPicPr>
+          <p:nvPr/>
+        </p:nvPicPr>
+        <p:blipFill>
+          <a:blip r:embed="rId3" cstate="email">
+            <a:extLst>
+              <a:ext uri="{28A0092B-C50C-407E-A947-70E740481C1C}">
+                <a14:useLocalDpi xmlns:a14="http://schemas.microsoft.com/office/drawing/2010/main" val="0"/>
+              </a:ext>
+            </a:extLst>
+          </a:blip>
+          <a:stretch>
+            <a:fillRect/>
+          </a:stretch>
+        </p:blipFill>
+        <p:spPr>
+          <a:xfrm>
+            <a:off x="4622795" y="1265367"/>
+            <a:ext cx="4227907" cy="3170930"/>
+          </a:xfrm>
+          <a:prstGeom prst="rect">
+            <a:avLst/>
+          </a:prstGeom>
+        </p:spPr>
+      </p:pic>
+      <p:pic>
+        <p:nvPicPr>
+          <p:cNvPr id="8" name="Imagen 7"/>
+          <p:cNvPicPr>
+            <a:picLocks noChangeAspect="1"/>
+          </p:cNvPicPr>
+          <p:nvPr/>
+        </p:nvPicPr>
+        <p:blipFill>
+          <a:blip r:embed="rId4" cstate="email">
+            <a:extLst>
+              <a:ext uri="{28A0092B-C50C-407E-A947-70E740481C1C}">
+                <a14:useLocalDpi xmlns:a14="http://schemas.microsoft.com/office/drawing/2010/main" val="0"/>
+              </a:ext>
+            </a:extLst>
+          </a:blip>
+          <a:stretch>
+            <a:fillRect/>
+          </a:stretch>
+        </p:blipFill>
+        <p:spPr>
+          <a:xfrm>
+            <a:off x="481811" y="1265367"/>
+            <a:ext cx="4140984" cy="3105738"/>
+          </a:xfrm>
+          <a:prstGeom prst="rect">
+            <a:avLst/>
+          </a:prstGeom>
+        </p:spPr>
+      </p:pic>
+      <p:sp>
+        <p:nvSpPr>
+          <p:cNvPr id="9" name="Elipse 8"/>
+          <p:cNvSpPr/>
+          <p:nvPr/>
+        </p:nvSpPr>
+        <p:spPr>
+          <a:xfrm>
+            <a:off x="1475117" y="2066449"/>
+            <a:ext cx="457200" cy="2134070"/>
+          </a:xfrm>
+          <a:prstGeom prst="ellipse">
+            <a:avLst/>
+          </a:prstGeom>
+          <a:noFill/>
+          <a:ln>
+            <a:solidFill>
+              <a:srgbClr val="FF0000"/>
+            </a:solidFill>
+          </a:ln>
+        </p:spPr>
+        <p:style>
+          <a:lnRef idx="2">
+            <a:schemeClr val="accent1">
+              <a:shade val="50000"/>
+            </a:schemeClr>
+          </a:lnRef>
+          <a:fillRef idx="1">
+            <a:schemeClr val="accent1"/>
+          </a:fillRef>
+          <a:effectRef idx="0">
+            <a:schemeClr val="accent1"/>
+          </a:effectRef>
+          <a:fontRef idx="minor">
+            <a:schemeClr val="lt1"/>
+          </a:fontRef>
+        </p:style>
+        <p:txBody>
+          <a:bodyPr rtlCol="0" anchor="ctr"/>
+          <a:lstStyle/>
+          <a:p>
+            <a:pPr algn="ctr"/>
+            <a:endParaRPr lang="en-US"/>
+          </a:p>
+        </p:txBody>
+      </p:sp>
+      <p:sp>
+        <p:nvSpPr>
+          <p:cNvPr id="10" name="Flecha derecha 9"/>
+          <p:cNvSpPr/>
+          <p:nvPr/>
+        </p:nvSpPr>
+        <p:spPr>
+          <a:xfrm rot="14770050">
+            <a:off x="1708029" y="4276707"/>
+            <a:ext cx="448574" cy="319178"/>
+          </a:xfrm>
+          <a:prstGeom prst="rightArrow">
+            <a:avLst/>
+          </a:prstGeom>
+        </p:spPr>
+        <p:style>
+          <a:lnRef idx="2">
+            <a:schemeClr val="accent2">
+              <a:shade val="50000"/>
+            </a:schemeClr>
+          </a:lnRef>
+          <a:fillRef idx="1">
+            <a:schemeClr val="accent2"/>
+          </a:fillRef>
+          <a:effectRef idx="0">
+            <a:schemeClr val="accent2"/>
+          </a:effectRef>
+          <a:fontRef idx="minor">
+            <a:schemeClr val="lt1"/>
+          </a:fontRef>
+        </p:style>
+        <p:txBody>
+          <a:bodyPr rtlCol="0" anchor="ctr"/>
+          <a:lstStyle/>
+          <a:p>
+            <a:pPr algn="ctr"/>
+            <a:endParaRPr lang="en-US"/>
+          </a:p>
+        </p:txBody>
+      </p:sp>
+      <p:sp>
+        <p:nvSpPr>
+          <p:cNvPr id="11" name="CuadroTexto 10"/>
+          <p:cNvSpPr txBox="1"/>
+          <p:nvPr/>
+        </p:nvSpPr>
+        <p:spPr>
+          <a:xfrm>
+            <a:off x="2091873" y="4521277"/>
+            <a:ext cx="2634054" cy="338554"/>
+          </a:xfrm>
+          <a:prstGeom prst="rect">
+            <a:avLst/>
+          </a:prstGeom>
+          <a:noFill/>
+        </p:spPr>
+        <p:txBody>
+          <a:bodyPr wrap="none" rtlCol="0">
+            <a:spAutoFit/>
+          </a:bodyPr>
+          <a:lstStyle/>
+          <a:p>
+            <a:r>
+              <a:rPr lang="en-US" sz="1600" dirty="0" smtClean="0"/>
+              <a:t>Huge F1 Score drop! Why?</a:t>
+            </a:r>
+            <a:endParaRPr lang="en-US" sz="1600" dirty="0"/>
           </a:p>
         </p:txBody>
       </p:sp>

</xml_diff>